<commit_message>
Added guest lecture & update middelpunten
</commit_message>
<xml_diff>
--- a/06 statistiek/02 Middelpunten schatten/02 Middelpunten schatten.pptx
+++ b/06 statistiek/02 Middelpunten schatten/02 Middelpunten schatten.pptx
@@ -5,10 +5,10 @@
     <p:sldMasterId id="2147483648" r:id="rId4"/>
   </p:sldMasterIdLst>
   <p:notesMasterIdLst>
-    <p:notesMasterId r:id="rId28"/>
+    <p:notesMasterId r:id="rId29"/>
   </p:notesMasterIdLst>
   <p:handoutMasterIdLst>
-    <p:handoutMasterId r:id="rId29"/>
+    <p:handoutMasterId r:id="rId30"/>
   </p:handoutMasterIdLst>
   <p:sldIdLst>
     <p:sldId id="256" r:id="rId5"/>
@@ -26,14 +26,15 @@
     <p:sldId id="2842" r:id="rId17"/>
     <p:sldId id="2849" r:id="rId18"/>
     <p:sldId id="2847" r:id="rId19"/>
-    <p:sldId id="2821" r:id="rId20"/>
-    <p:sldId id="2853" r:id="rId21"/>
-    <p:sldId id="2835" r:id="rId22"/>
-    <p:sldId id="2848" r:id="rId23"/>
-    <p:sldId id="2850" r:id="rId24"/>
-    <p:sldId id="2854" r:id="rId25"/>
-    <p:sldId id="270" r:id="rId26"/>
-    <p:sldId id="271" r:id="rId27"/>
+    <p:sldId id="2855" r:id="rId20"/>
+    <p:sldId id="2821" r:id="rId21"/>
+    <p:sldId id="2853" r:id="rId22"/>
+    <p:sldId id="2835" r:id="rId23"/>
+    <p:sldId id="2848" r:id="rId24"/>
+    <p:sldId id="2850" r:id="rId25"/>
+    <p:sldId id="2854" r:id="rId26"/>
+    <p:sldId id="270" r:id="rId27"/>
+    <p:sldId id="271" r:id="rId28"/>
   </p:sldIdLst>
   <p:sldSz cx="12192000" cy="6858000"/>
   <p:notesSz cx="6858000" cy="9144000"/>
@@ -484,7 +485,7 @@
           <a:p>
             <a:fld id="{A21F7CDD-23CF-5441-8EE8-3A82C7512332}" type="datetimeFigureOut">
               <a:rPr lang="nl-NL" smtClean="0"/>
-              <a:t>30-4-2023</a:t>
+              <a:t>2-5-2023</a:t>
             </a:fld>
             <a:endParaRPr lang="nl-NL"/>
           </a:p>
@@ -817,7 +818,7 @@
           <a:p>
             <a:fld id="{4AF6D0A1-0AEB-9A4F-9A1A-8EF3D1567A45}" type="slidenum">
               <a:rPr lang="nl-NL" smtClean="0"/>
-              <a:t>18</a:t>
+              <a:t>19</a:t>
             </a:fld>
             <a:endParaRPr lang="nl-NL"/>
           </a:p>
@@ -9617,6 +9618,590 @@
       </p:grpSpPr>
       <p:sp>
         <p:nvSpPr>
+          <p:cNvPr id="2" name="Title 1">
+            <a:extLst>
+              <a:ext uri="{FF2B5EF4-FFF2-40B4-BE49-F238E27FC236}">
+                <a16:creationId xmlns:a16="http://schemas.microsoft.com/office/drawing/2014/main" id="{A73BB94C-6FF5-84B5-897E-50E97B75F6CD}"/>
+              </a:ext>
+            </a:extLst>
+          </p:cNvPr>
+          <p:cNvSpPr>
+            <a:spLocks noGrp="1"/>
+          </p:cNvSpPr>
+          <p:nvPr>
+            <p:ph type="title"/>
+          </p:nvPr>
+        </p:nvSpPr>
+        <p:spPr>
+          <a:xfrm>
+            <a:off x="360000" y="360000"/>
+            <a:ext cx="11832000" cy="1325563"/>
+          </a:xfrm>
+        </p:spPr>
+        <p:txBody>
+          <a:bodyPr>
+            <a:normAutofit/>
+          </a:bodyPr>
+          <a:lstStyle/>
+          <a:p>
+            <a:r>
+              <a:rPr lang="en-GB" sz="3200" dirty="0"/>
+              <a:t>Centrale </a:t>
+            </a:r>
+            <a:r>
+              <a:rPr lang="en-GB" sz="3200" dirty="0" err="1"/>
+              <a:t>locaties</a:t>
+            </a:r>
+            <a:r>
+              <a:rPr lang="en-GB" sz="3200" dirty="0"/>
+              <a:t> </a:t>
+            </a:r>
+            <a:r>
+              <a:rPr lang="en-GB" sz="3200" dirty="0" err="1"/>
+              <a:t>schatten</a:t>
+            </a:r>
+            <a:r>
+              <a:rPr lang="en-GB" sz="3200" dirty="0"/>
+              <a:t> is de kern van </a:t>
+            </a:r>
+            <a:r>
+              <a:rPr lang="en-GB" sz="3200" dirty="0" err="1"/>
+              <a:t>veel</a:t>
+            </a:r>
+            <a:r>
+              <a:rPr lang="en-GB" sz="3200" dirty="0"/>
+              <a:t> “ML </a:t>
+            </a:r>
+            <a:r>
+              <a:rPr lang="en-GB" sz="3200" dirty="0" err="1"/>
+              <a:t>algoritmes</a:t>
+            </a:r>
+            <a:r>
+              <a:rPr lang="en-GB" sz="3200" dirty="0"/>
+              <a:t>”</a:t>
+            </a:r>
+          </a:p>
+        </p:txBody>
+      </p:sp>
+      <p:sp>
+        <p:nvSpPr>
+          <p:cNvPr id="3" name="Content Placeholder 2">
+            <a:extLst>
+              <a:ext uri="{FF2B5EF4-FFF2-40B4-BE49-F238E27FC236}">
+                <a16:creationId xmlns:a16="http://schemas.microsoft.com/office/drawing/2014/main" id="{62A6B2FE-DA3C-CF5A-96E5-0F2D457988E7}"/>
+              </a:ext>
+            </a:extLst>
+          </p:cNvPr>
+          <p:cNvSpPr>
+            <a:spLocks noGrp="1"/>
+          </p:cNvSpPr>
+          <p:nvPr>
+            <p:ph idx="1"/>
+          </p:nvPr>
+        </p:nvSpPr>
+        <p:spPr>
+          <a:xfrm>
+            <a:off x="360000" y="1685563"/>
+            <a:ext cx="11258084" cy="4252900"/>
+          </a:xfrm>
+        </p:spPr>
+        <p:txBody>
+          <a:bodyPr/>
+          <a:lstStyle/>
+          <a:p>
+            <a:r>
+              <a:rPr lang="en-GB" dirty="0" err="1"/>
+              <a:t>Bij</a:t>
+            </a:r>
+            <a:r>
+              <a:rPr lang="en-GB" dirty="0"/>
+              <a:t> het </a:t>
+            </a:r>
+            <a:r>
+              <a:rPr lang="en-GB" dirty="0" err="1"/>
+              <a:t>zoeken</a:t>
+            </a:r>
+            <a:r>
+              <a:rPr lang="en-GB" dirty="0"/>
+              <a:t> van </a:t>
+            </a:r>
+            <a:r>
+              <a:rPr lang="en-GB" dirty="0" err="1"/>
+              <a:t>een</a:t>
+            </a:r>
+            <a:r>
+              <a:rPr lang="en-GB" dirty="0"/>
+              <a:t> “best guess” </a:t>
+            </a:r>
+            <a:r>
+              <a:rPr lang="en-GB" dirty="0" err="1"/>
+              <a:t>komt</a:t>
+            </a:r>
+            <a:r>
+              <a:rPr lang="en-GB" dirty="0"/>
+              <a:t> het </a:t>
+            </a:r>
+            <a:r>
+              <a:rPr lang="en-GB" dirty="0" err="1"/>
+              <a:t>vaak</a:t>
+            </a:r>
+            <a:r>
+              <a:rPr lang="en-GB" dirty="0"/>
+              <a:t> </a:t>
+            </a:r>
+            <a:r>
+              <a:rPr lang="en-GB" dirty="0" err="1"/>
+              <a:t>neer</a:t>
+            </a:r>
+            <a:r>
+              <a:rPr lang="en-GB" dirty="0"/>
+              <a:t> op:</a:t>
+            </a:r>
+          </a:p>
+          <a:p>
+            <a:pPr lvl="1"/>
+            <a:r>
+              <a:rPr lang="en-GB" dirty="0" err="1"/>
+              <a:t>Kies</a:t>
+            </a:r>
+            <a:r>
+              <a:rPr lang="en-GB" dirty="0"/>
+              <a:t> je </a:t>
+            </a:r>
+            <a:r>
+              <a:rPr lang="en-GB" dirty="0" err="1"/>
+              <a:t>beste</a:t>
+            </a:r>
+            <a:r>
+              <a:rPr lang="en-GB" dirty="0"/>
+              <a:t> features (</a:t>
+            </a:r>
+            <a:r>
+              <a:rPr lang="en-GB" dirty="0" err="1"/>
+              <a:t>niet</a:t>
+            </a:r>
+            <a:r>
+              <a:rPr lang="en-GB" dirty="0"/>
+              <a:t> </a:t>
+            </a:r>
+            <a:r>
+              <a:rPr lang="en-GB" dirty="0" err="1"/>
+              <a:t>te</a:t>
+            </a:r>
+            <a:r>
+              <a:rPr lang="en-GB" dirty="0"/>
+              <a:t> </a:t>
+            </a:r>
+            <a:r>
+              <a:rPr lang="en-GB" dirty="0" err="1"/>
+              <a:t>veel</a:t>
+            </a:r>
+            <a:r>
+              <a:rPr lang="en-GB" dirty="0"/>
+              <a:t>, </a:t>
+            </a:r>
+            <a:r>
+              <a:rPr lang="en-GB" dirty="0" err="1"/>
+              <a:t>niet</a:t>
+            </a:r>
+            <a:r>
+              <a:rPr lang="en-GB" dirty="0"/>
+              <a:t> </a:t>
+            </a:r>
+            <a:r>
+              <a:rPr lang="en-GB" dirty="0" err="1"/>
+              <a:t>te</a:t>
+            </a:r>
+            <a:r>
+              <a:rPr lang="en-GB" dirty="0"/>
+              <a:t> </a:t>
+            </a:r>
+            <a:r>
+              <a:rPr lang="en-GB" dirty="0" err="1"/>
+              <a:t>weinig</a:t>
+            </a:r>
+            <a:r>
+              <a:rPr lang="en-GB" dirty="0"/>
+              <a:t>).</a:t>
+            </a:r>
+          </a:p>
+          <a:p>
+            <a:pPr lvl="1"/>
+            <a:r>
+              <a:rPr lang="en-GB" dirty="0" err="1"/>
+              <a:t>Voorspel</a:t>
+            </a:r>
+            <a:r>
+              <a:rPr lang="en-GB" dirty="0"/>
+              <a:t> </a:t>
+            </a:r>
+            <a:r>
+              <a:rPr lang="en-GB" dirty="0" err="1"/>
+              <a:t>een</a:t>
+            </a:r>
+            <a:r>
+              <a:rPr lang="en-GB" dirty="0"/>
+              <a:t> </a:t>
+            </a:r>
+            <a:r>
+              <a:rPr lang="en-GB" dirty="0" err="1"/>
+              <a:t>waarde</a:t>
+            </a:r>
+            <a:r>
+              <a:rPr lang="en-GB" dirty="0"/>
+              <a:t> die </a:t>
+            </a:r>
+            <a:r>
+              <a:rPr lang="en-GB" dirty="0" err="1"/>
+              <a:t>overeenkomt</a:t>
+            </a:r>
+            <a:r>
+              <a:rPr lang="en-GB" dirty="0"/>
+              <a:t> met </a:t>
+            </a:r>
+            <a:r>
+              <a:rPr lang="en-GB" dirty="0" err="1"/>
+              <a:t>een</a:t>
+            </a:r>
+            <a:r>
+              <a:rPr lang="en-GB" dirty="0"/>
+              <a:t> “</a:t>
+            </a:r>
+            <a:r>
+              <a:rPr lang="en-GB" dirty="0" err="1"/>
+              <a:t>verwachte</a:t>
+            </a:r>
+            <a:r>
+              <a:rPr lang="en-GB" dirty="0"/>
+              <a:t> </a:t>
+            </a:r>
+            <a:r>
+              <a:rPr lang="en-GB" dirty="0" err="1"/>
+              <a:t>waarde</a:t>
+            </a:r>
+            <a:r>
+              <a:rPr lang="en-GB" dirty="0"/>
+              <a:t>” op basis van de features.</a:t>
+            </a:r>
+          </a:p>
+          <a:p>
+            <a:pPr marL="457200" lvl="1" indent="0">
+              <a:buNone/>
+            </a:pPr>
+            <a:r>
+              <a:rPr lang="en-GB" b="1" dirty="0" err="1"/>
+              <a:t>Vb</a:t>
+            </a:r>
+            <a:r>
+              <a:rPr lang="en-GB" b="1" dirty="0"/>
+              <a:t>:</a:t>
+            </a:r>
+            <a:r>
+              <a:rPr lang="en-GB" dirty="0"/>
+              <a:t> </a:t>
+            </a:r>
+            <a:r>
+              <a:rPr lang="en-GB" dirty="0" err="1"/>
+              <a:t>Leerlingen</a:t>
+            </a:r>
+            <a:r>
+              <a:rPr lang="en-GB" dirty="0"/>
+              <a:t> op </a:t>
+            </a:r>
+            <a:r>
+              <a:rPr lang="en-GB" dirty="0" err="1"/>
+              <a:t>een</a:t>
+            </a:r>
+            <a:r>
+              <a:rPr lang="en-GB" dirty="0"/>
+              <a:t> school </a:t>
+            </a:r>
+            <a:r>
+              <a:rPr lang="en-GB" dirty="0" err="1"/>
+              <a:t>groeperen</a:t>
+            </a:r>
+            <a:r>
+              <a:rPr lang="en-GB" dirty="0"/>
+              <a:t> per </a:t>
+            </a:r>
+            <a:r>
+              <a:rPr lang="en-GB" dirty="0" err="1"/>
+              <a:t>leeftijd</a:t>
+            </a:r>
+            <a:r>
+              <a:rPr lang="en-GB" dirty="0"/>
+              <a:t> &amp; per </a:t>
+            </a:r>
+            <a:r>
+              <a:rPr lang="en-GB" dirty="0" err="1"/>
+              <a:t>geslacht</a:t>
+            </a:r>
+            <a:r>
+              <a:rPr lang="en-GB" dirty="0"/>
+              <a:t> </a:t>
+            </a:r>
+            <a:r>
+              <a:rPr lang="en-GB" dirty="0" err="1"/>
+              <a:t>en</a:t>
+            </a:r>
+            <a:r>
+              <a:rPr lang="en-GB" dirty="0"/>
+              <a:t> dan </a:t>
+            </a:r>
+            <a:r>
+              <a:rPr lang="en-GB" dirty="0" err="1"/>
+              <a:t>gemiddeldes</a:t>
+            </a:r>
+            <a:r>
+              <a:rPr lang="en-GB" dirty="0"/>
+              <a:t> </a:t>
+            </a:r>
+            <a:r>
+              <a:rPr lang="en-GB" dirty="0" err="1"/>
+              <a:t>nemen</a:t>
+            </a:r>
+            <a:r>
+              <a:rPr lang="en-GB" dirty="0"/>
+              <a:t> </a:t>
+            </a:r>
+            <a:r>
+              <a:rPr lang="en-GB" dirty="0" err="1"/>
+              <a:t>voor</a:t>
+            </a:r>
+            <a:r>
+              <a:rPr lang="en-GB" dirty="0"/>
+              <a:t> de </a:t>
+            </a:r>
+            <a:r>
+              <a:rPr lang="en-GB" dirty="0" err="1"/>
+              <a:t>lengte</a:t>
+            </a:r>
+            <a:r>
+              <a:rPr lang="en-GB" dirty="0"/>
+              <a:t> </a:t>
+            </a:r>
+            <a:r>
+              <a:rPr lang="en-GB" dirty="0" err="1"/>
+              <a:t>te</a:t>
+            </a:r>
+            <a:r>
+              <a:rPr lang="en-GB" dirty="0"/>
+              <a:t> </a:t>
+            </a:r>
+            <a:r>
+              <a:rPr lang="en-GB" dirty="0" err="1"/>
+              <a:t>voorspellen</a:t>
+            </a:r>
+            <a:r>
+              <a:rPr lang="en-GB" dirty="0"/>
+              <a:t>.</a:t>
+            </a:r>
+          </a:p>
+          <a:p>
+            <a:pPr marL="457200" lvl="1" indent="0">
+              <a:buNone/>
+            </a:pPr>
+            <a:br>
+              <a:rPr lang="en-GB" dirty="0"/>
+            </a:br>
+            <a:r>
+              <a:rPr lang="en-GB" dirty="0"/>
+              <a:t>Je </a:t>
+            </a:r>
+            <a:r>
+              <a:rPr lang="en-GB" dirty="0" err="1"/>
+              <a:t>kan</a:t>
+            </a:r>
+            <a:r>
+              <a:rPr lang="en-GB" dirty="0"/>
+              <a:t> </a:t>
+            </a:r>
+            <a:r>
+              <a:rPr lang="en-GB" dirty="0" err="1"/>
+              <a:t>leeftijd</a:t>
+            </a:r>
+            <a:r>
+              <a:rPr lang="en-GB" dirty="0"/>
+              <a:t> </a:t>
+            </a:r>
+            <a:r>
+              <a:rPr lang="en-GB" dirty="0" err="1"/>
+              <a:t>ook</a:t>
+            </a:r>
+            <a:r>
+              <a:rPr lang="en-GB" dirty="0"/>
+              <a:t> </a:t>
+            </a:r>
+            <a:r>
+              <a:rPr lang="en-GB" dirty="0" err="1"/>
+              <a:t>als</a:t>
+            </a:r>
+            <a:r>
+              <a:rPr lang="en-GB" dirty="0"/>
+              <a:t> continue </a:t>
+            </a:r>
+            <a:r>
+              <a:rPr lang="en-GB" dirty="0" err="1"/>
+              <a:t>variabele</a:t>
+            </a:r>
+            <a:r>
+              <a:rPr lang="en-GB" dirty="0"/>
+              <a:t> </a:t>
+            </a:r>
+            <a:r>
+              <a:rPr lang="en-GB" dirty="0" err="1"/>
+              <a:t>nemen</a:t>
+            </a:r>
+            <a:r>
+              <a:rPr lang="en-GB" dirty="0"/>
+              <a:t> </a:t>
+            </a:r>
+            <a:r>
+              <a:rPr lang="en-GB" dirty="0" err="1"/>
+              <a:t>en</a:t>
+            </a:r>
+            <a:r>
+              <a:rPr lang="en-GB" dirty="0"/>
+              <a:t> dan ga je </a:t>
+            </a:r>
+            <a:r>
+              <a:rPr lang="en-GB" dirty="0" err="1"/>
+              <a:t>gemiddeldes</a:t>
+            </a:r>
+            <a:r>
+              <a:rPr lang="en-GB" dirty="0"/>
+              <a:t> </a:t>
+            </a:r>
+            <a:r>
+              <a:rPr lang="en-GB" dirty="0" err="1"/>
+              <a:t>voorspellen</a:t>
+            </a:r>
+            <a:r>
+              <a:rPr lang="en-GB" dirty="0"/>
+              <a:t> door </a:t>
+            </a:r>
+            <a:r>
+              <a:rPr lang="en-GB" dirty="0" err="1"/>
+              <a:t>een</a:t>
+            </a:r>
+            <a:r>
+              <a:rPr lang="en-GB" dirty="0"/>
+              <a:t> </a:t>
+            </a:r>
+            <a:r>
+              <a:rPr lang="en-GB" i="1" dirty="0" err="1"/>
+              <a:t>gemiddelde</a:t>
+            </a:r>
+            <a:r>
+              <a:rPr lang="en-GB" i="1" dirty="0"/>
+              <a:t> </a:t>
+            </a:r>
+            <a:r>
+              <a:rPr lang="en-GB" i="1" dirty="0" err="1"/>
+              <a:t>trendlijn</a:t>
+            </a:r>
+            <a:r>
+              <a:rPr lang="en-GB" dirty="0"/>
+              <a:t> </a:t>
+            </a:r>
+            <a:r>
+              <a:rPr lang="en-GB" dirty="0" err="1"/>
+              <a:t>te</a:t>
+            </a:r>
+            <a:r>
+              <a:rPr lang="en-GB" dirty="0"/>
+              <a:t> </a:t>
+            </a:r>
+            <a:r>
+              <a:rPr lang="en-GB" dirty="0" err="1"/>
+              <a:t>tekenen</a:t>
+            </a:r>
+            <a:r>
+              <a:rPr lang="en-GB" dirty="0"/>
+              <a:t> </a:t>
+            </a:r>
+            <a:r>
+              <a:rPr lang="en-GB" dirty="0" err="1"/>
+              <a:t>voor</a:t>
+            </a:r>
+            <a:r>
+              <a:rPr lang="en-GB" dirty="0"/>
+              <a:t> </a:t>
+            </a:r>
+            <a:r>
+              <a:rPr lang="en-GB" dirty="0" err="1"/>
+              <a:t>mannen</a:t>
+            </a:r>
+            <a:r>
+              <a:rPr lang="en-GB" dirty="0"/>
+              <a:t> </a:t>
+            </a:r>
+            <a:r>
+              <a:rPr lang="en-GB" dirty="0" err="1"/>
+              <a:t>en</a:t>
+            </a:r>
+            <a:r>
+              <a:rPr lang="en-GB" dirty="0"/>
+              <a:t> </a:t>
+            </a:r>
+            <a:r>
+              <a:rPr lang="en-GB" dirty="0" err="1"/>
+              <a:t>vrouwen</a:t>
+            </a:r>
+            <a:r>
+              <a:rPr lang="en-GB" dirty="0"/>
+              <a:t>.</a:t>
+            </a:r>
+          </a:p>
+          <a:p>
+            <a:pPr marL="457200" lvl="1" indent="0">
+              <a:buNone/>
+            </a:pPr>
+            <a:endParaRPr lang="en-GB" b="1" dirty="0"/>
+          </a:p>
+          <a:p>
+            <a:pPr marL="457200" lvl="1" indent="0">
+              <a:buNone/>
+            </a:pPr>
+            <a:endParaRPr lang="en-GB" b="1" dirty="0"/>
+          </a:p>
+        </p:txBody>
+      </p:sp>
+    </p:spTree>
+    <p:extLst>
+      <p:ext uri="{BB962C8B-B14F-4D97-AF65-F5344CB8AC3E}">
+        <p14:creationId xmlns:p14="http://schemas.microsoft.com/office/powerpoint/2010/main" val="2386824548"/>
+      </p:ext>
+    </p:extLst>
+  </p:cSld>
+  <p:clrMapOvr>
+    <a:masterClrMapping/>
+  </p:clrMapOvr>
+  <p:transition spd="slow">
+    <p:push dir="u"/>
+  </p:transition>
+</p:sld>
+</file>
+
+<file path=ppt/slides/slide17.xml><?xml version="1.0" encoding="utf-8"?>
+<p:sld xmlns:a="http://schemas.openxmlformats.org/drawingml/2006/main" xmlns:r="http://schemas.openxmlformats.org/officeDocument/2006/relationships" xmlns:p="http://schemas.openxmlformats.org/presentationml/2006/main">
+  <p:cSld>
+    <p:spTree>
+      <p:nvGrpSpPr>
+        <p:cNvPr id="1" name=""/>
+        <p:cNvGrpSpPr/>
+        <p:nvPr/>
+      </p:nvGrpSpPr>
+      <p:grpSpPr>
+        <a:xfrm>
+          <a:off x="0" y="0"/>
+          <a:ext cx="0" cy="0"/>
+          <a:chOff x="0" y="0"/>
+          <a:chExt cx="0" cy="0"/>
+        </a:xfrm>
+      </p:grpSpPr>
+      <p:sp>
+        <p:nvSpPr>
           <p:cNvPr id="5" name="Title 2">
             <a:extLst>
               <a:ext uri="{FF2B5EF4-FFF2-40B4-BE49-F238E27FC236}">
@@ -9696,7 +10281,7 @@
 </p:sld>
 </file>
 
-<file path=ppt/slides/slide17.xml><?xml version="1.0" encoding="utf-8"?>
+<file path=ppt/slides/slide18.xml><?xml version="1.0" encoding="utf-8"?>
 <p:sld xmlns:a="http://schemas.openxmlformats.org/drawingml/2006/main" xmlns:r="http://schemas.openxmlformats.org/officeDocument/2006/relationships" xmlns:p="http://schemas.openxmlformats.org/presentationml/2006/main">
   <p:cSld>
     <p:spTree>
@@ -9894,7 +10479,7 @@
 </p:sld>
 </file>
 
-<file path=ppt/slides/slide18.xml><?xml version="1.0" encoding="utf-8"?>
+<file path=ppt/slides/slide19.xml><?xml version="1.0" encoding="utf-8"?>
 <p:sld xmlns:a="http://schemas.openxmlformats.org/drawingml/2006/main" xmlns:r="http://schemas.openxmlformats.org/officeDocument/2006/relationships" xmlns:p="http://schemas.openxmlformats.org/presentationml/2006/main">
   <p:cSld>
     <p:spTree>
@@ -11253,7 +11838,75 @@
 </p:sld>
 </file>
 
-<file path=ppt/slides/slide19.xml><?xml version="1.0" encoding="utf-8"?>
+<file path=ppt/slides/slide2.xml><?xml version="1.0" encoding="utf-8"?>
+<p:sld xmlns:a="http://schemas.openxmlformats.org/drawingml/2006/main" xmlns:r="http://schemas.openxmlformats.org/officeDocument/2006/relationships" xmlns:p="http://schemas.openxmlformats.org/presentationml/2006/main">
+  <p:cSld>
+    <p:spTree>
+      <p:nvGrpSpPr>
+        <p:cNvPr id="1" name=""/>
+        <p:cNvGrpSpPr/>
+        <p:nvPr/>
+      </p:nvGrpSpPr>
+      <p:grpSpPr>
+        <a:xfrm>
+          <a:off x="0" y="0"/>
+          <a:ext cx="0" cy="0"/>
+          <a:chOff x="0" y="0"/>
+          <a:chExt cx="0" cy="0"/>
+        </a:xfrm>
+      </p:grpSpPr>
+      <p:sp>
+        <p:nvSpPr>
+          <p:cNvPr id="5" name="Title 2">
+            <a:extLst>
+              <a:ext uri="{FF2B5EF4-FFF2-40B4-BE49-F238E27FC236}">
+                <a16:creationId xmlns:a16="http://schemas.microsoft.com/office/drawing/2014/main" id="{064A51AF-D729-194D-8079-0110ED3A4EA6}"/>
+              </a:ext>
+            </a:extLst>
+          </p:cNvPr>
+          <p:cNvSpPr>
+            <a:spLocks noGrp="1"/>
+          </p:cNvSpPr>
+          <p:nvPr>
+            <p:ph type="title"/>
+          </p:nvPr>
+        </p:nvSpPr>
+        <p:spPr>
+          <a:xfrm>
+            <a:off x="360000" y="360000"/>
+            <a:ext cx="11225885" cy="598970"/>
+          </a:xfrm>
+        </p:spPr>
+        <p:txBody>
+          <a:bodyPr>
+            <a:noAutofit/>
+          </a:bodyPr>
+          <a:lstStyle/>
+          <a:p>
+            <a:r>
+              <a:rPr lang="en-US" dirty="0"/>
+              <a:t>Resources</a:t>
+            </a:r>
+          </a:p>
+        </p:txBody>
+      </p:sp>
+    </p:spTree>
+    <p:extLst>
+      <p:ext uri="{BB962C8B-B14F-4D97-AF65-F5344CB8AC3E}">
+        <p14:creationId xmlns:p14="http://schemas.microsoft.com/office/powerpoint/2010/main" val="1409069374"/>
+      </p:ext>
+    </p:extLst>
+  </p:cSld>
+  <p:clrMapOvr>
+    <a:masterClrMapping/>
+  </p:clrMapOvr>
+  <p:transition spd="slow">
+    <p:push dir="u"/>
+  </p:transition>
+</p:sld>
+</file>
+
+<file path=ppt/slides/slide20.xml><?xml version="1.0" encoding="utf-8"?>
 <p:sld xmlns:a="http://schemas.openxmlformats.org/drawingml/2006/main" xmlns:r="http://schemas.openxmlformats.org/officeDocument/2006/relationships" xmlns:p="http://schemas.openxmlformats.org/presentationml/2006/main">
   <p:cSld>
     <p:spTree>
@@ -12420,75 +13073,7 @@
 </p:sld>
 </file>
 
-<file path=ppt/slides/slide2.xml><?xml version="1.0" encoding="utf-8"?>
-<p:sld xmlns:a="http://schemas.openxmlformats.org/drawingml/2006/main" xmlns:r="http://schemas.openxmlformats.org/officeDocument/2006/relationships" xmlns:p="http://schemas.openxmlformats.org/presentationml/2006/main">
-  <p:cSld>
-    <p:spTree>
-      <p:nvGrpSpPr>
-        <p:cNvPr id="1" name=""/>
-        <p:cNvGrpSpPr/>
-        <p:nvPr/>
-      </p:nvGrpSpPr>
-      <p:grpSpPr>
-        <a:xfrm>
-          <a:off x="0" y="0"/>
-          <a:ext cx="0" cy="0"/>
-          <a:chOff x="0" y="0"/>
-          <a:chExt cx="0" cy="0"/>
-        </a:xfrm>
-      </p:grpSpPr>
-      <p:sp>
-        <p:nvSpPr>
-          <p:cNvPr id="5" name="Title 2">
-            <a:extLst>
-              <a:ext uri="{FF2B5EF4-FFF2-40B4-BE49-F238E27FC236}">
-                <a16:creationId xmlns:a16="http://schemas.microsoft.com/office/drawing/2014/main" id="{064A51AF-D729-194D-8079-0110ED3A4EA6}"/>
-              </a:ext>
-            </a:extLst>
-          </p:cNvPr>
-          <p:cNvSpPr>
-            <a:spLocks noGrp="1"/>
-          </p:cNvSpPr>
-          <p:nvPr>
-            <p:ph type="title"/>
-          </p:nvPr>
-        </p:nvSpPr>
-        <p:spPr>
-          <a:xfrm>
-            <a:off x="360000" y="360000"/>
-            <a:ext cx="11225885" cy="598970"/>
-          </a:xfrm>
-        </p:spPr>
-        <p:txBody>
-          <a:bodyPr>
-            <a:noAutofit/>
-          </a:bodyPr>
-          <a:lstStyle/>
-          <a:p>
-            <a:r>
-              <a:rPr lang="en-US" dirty="0"/>
-              <a:t>Resources</a:t>
-            </a:r>
-          </a:p>
-        </p:txBody>
-      </p:sp>
-    </p:spTree>
-    <p:extLst>
-      <p:ext uri="{BB962C8B-B14F-4D97-AF65-F5344CB8AC3E}">
-        <p14:creationId xmlns:p14="http://schemas.microsoft.com/office/powerpoint/2010/main" val="1409069374"/>
-      </p:ext>
-    </p:extLst>
-  </p:cSld>
-  <p:clrMapOvr>
-    <a:masterClrMapping/>
-  </p:clrMapOvr>
-  <p:transition spd="slow">
-    <p:push dir="u"/>
-  </p:transition>
-</p:sld>
-</file>
-
-<file path=ppt/slides/slide20.xml><?xml version="1.0" encoding="utf-8"?>
+<file path=ppt/slides/slide21.xml><?xml version="1.0" encoding="utf-8"?>
 <p:sld xmlns:a="http://schemas.openxmlformats.org/drawingml/2006/main" xmlns:r="http://schemas.openxmlformats.org/officeDocument/2006/relationships" xmlns:p="http://schemas.openxmlformats.org/presentationml/2006/main">
   <p:cSld>
     <p:spTree>
@@ -13116,7 +13701,7 @@
 </p:sld>
 </file>
 
-<file path=ppt/slides/slide21.xml><?xml version="1.0" encoding="utf-8"?>
+<file path=ppt/slides/slide22.xml><?xml version="1.0" encoding="utf-8"?>
 <p:sld xmlns:a="http://schemas.openxmlformats.org/drawingml/2006/main" xmlns:r="http://schemas.openxmlformats.org/officeDocument/2006/relationships" xmlns:p="http://schemas.openxmlformats.org/presentationml/2006/main">
   <p:cSld>
     <p:spTree>
@@ -13422,7 +14007,7 @@
 </p:sld>
 </file>
 
-<file path=ppt/slides/slide22.xml><?xml version="1.0" encoding="utf-8"?>
+<file path=ppt/slides/slide23.xml><?xml version="1.0" encoding="utf-8"?>
 <p:sld xmlns:a="http://schemas.openxmlformats.org/drawingml/2006/main" xmlns:r="http://schemas.openxmlformats.org/officeDocument/2006/relationships" xmlns:p="http://schemas.openxmlformats.org/presentationml/2006/main">
   <p:cSld>
     <p:spTree>
@@ -13540,7 +14125,7 @@
 </p:sld>
 </file>
 
-<file path=ppt/slides/slide23.xml><?xml version="1.0" encoding="utf-8"?>
+<file path=ppt/slides/slide24.xml><?xml version="1.0" encoding="utf-8"?>
 <p:sld xmlns:a="http://schemas.openxmlformats.org/drawingml/2006/main" xmlns:r="http://schemas.openxmlformats.org/officeDocument/2006/relationships" xmlns:p="http://schemas.openxmlformats.org/presentationml/2006/main">
   <p:cSld>
     <p:spTree>
@@ -18118,6 +18703,15 @@
 </file>
 
 <file path=customXml/item1.xml><?xml version="1.0" encoding="utf-8"?>
+<?mso-contentType ?>
+<FormTemplates xmlns="http://schemas.microsoft.com/sharepoint/v3/contenttype/forms">
+  <Display>DocumentLibraryForm</Display>
+  <Edit>DocumentLibraryForm</Edit>
+  <New>DocumentLibraryForm</New>
+</FormTemplates>
+</file>
+
+<file path=customXml/item2.xml><?xml version="1.0" encoding="utf-8"?>
 <ct:contentTypeSchema xmlns:ct="http://schemas.microsoft.com/office/2006/metadata/contentType" xmlns:ma="http://schemas.microsoft.com/office/2006/metadata/properties/metaAttributes" ct:_="" ma:_="" ma:contentTypeName="Document" ma:contentTypeID="0x0101000198679BBEF31544BF1C5E94380D134B" ma:contentTypeVersion="11" ma:contentTypeDescription="Een nieuw document maken." ma:contentTypeScope="" ma:versionID="928c7503a392f8c19ded68dda1121e60">
   <xsd:schema xmlns:xsd="http://www.w3.org/2001/XMLSchema" xmlns:xs="http://www.w3.org/2001/XMLSchema" xmlns:p="http://schemas.microsoft.com/office/2006/metadata/properties" xmlns:ns2="e60f335d-e4bd-4666-890a-892f5e8cff2d" xmlns:ns3="d5f8be41-0169-49b5-b686-d4287d5aac73" targetNamespace="http://schemas.microsoft.com/office/2006/metadata/properties" ma:root="true" ma:fieldsID="8f91e335dd6c64b6d30237bdd58663b1" ns2:_="" ns3:_="">
     <xsd:import namespace="e60f335d-e4bd-4666-890a-892f5e8cff2d"/>
@@ -18328,15 +18922,6 @@
 </ct:contentTypeSchema>
 </file>
 
-<file path=customXml/item2.xml><?xml version="1.0" encoding="utf-8"?>
-<?mso-contentType ?>
-<FormTemplates xmlns="http://schemas.microsoft.com/sharepoint/v3/contenttype/forms">
-  <Display>DocumentLibraryForm</Display>
-  <Edit>DocumentLibraryForm</Edit>
-  <New>DocumentLibraryForm</New>
-</FormTemplates>
-</file>
-
 <file path=customXml/item3.xml><?xml version="1.0" encoding="utf-8"?>
 <p:properties xmlns:p="http://schemas.microsoft.com/office/2006/metadata/properties" xmlns:xsi="http://www.w3.org/2001/XMLSchema-instance" xmlns:pc="http://schemas.microsoft.com/office/infopath/2007/PartnerControls">
   <documentManagement/>
@@ -18344,6 +18929,14 @@
 </file>
 
 <file path=customXml/itemProps1.xml><?xml version="1.0" encoding="utf-8"?>
+<ds:datastoreItem xmlns:ds="http://schemas.openxmlformats.org/officeDocument/2006/customXml" ds:itemID="{2EBDE53D-6E78-4709-828D-56940832F243}">
+  <ds:schemaRefs>
+    <ds:schemaRef ds:uri="http://schemas.microsoft.com/sharepoint/v3/contenttype/forms"/>
+  </ds:schemaRefs>
+</ds:datastoreItem>
+</file>
+
+<file path=customXml/itemProps2.xml><?xml version="1.0" encoding="utf-8"?>
 <ds:datastoreItem xmlns:ds="http://schemas.openxmlformats.org/officeDocument/2006/customXml" ds:itemID="{D95D00C5-A255-4B17-B283-B46EAB3061C5}">
   <ds:schemaRefs>
     <ds:schemaRef ds:uri="http://schemas.microsoft.com/office/2006/metadata/contentType"/>
@@ -18358,14 +18951,6 @@
     <ds:schemaRef ds:uri="http://purl.org/dc/elements/1.1/"/>
     <ds:schemaRef ds:uri="http://purl.org/dc/terms/"/>
     <ds:schemaRef ds:uri="http://schemas.microsoft.com/internal/obd"/>
-  </ds:schemaRefs>
-</ds:datastoreItem>
-</file>
-
-<file path=customXml/itemProps2.xml><?xml version="1.0" encoding="utf-8"?>
-<ds:datastoreItem xmlns:ds="http://schemas.openxmlformats.org/officeDocument/2006/customXml" ds:itemID="{2EBDE53D-6E78-4709-828D-56940832F243}">
-  <ds:schemaRefs>
-    <ds:schemaRef ds:uri="http://schemas.microsoft.com/sharepoint/v3/contenttype/forms"/>
   </ds:schemaRefs>
 </ds:datastoreItem>
 </file>

</xml_diff>

<commit_message>
Corrected computation of weighted median
</commit_message>
<xml_diff>
--- a/06 statistiek/02 Middelpunten schatten/02 Middelpunten schatten.pptx
+++ b/06 statistiek/02 Middelpunten schatten/02 Middelpunten schatten.pptx
@@ -5,10 +5,10 @@
     <p:sldMasterId id="2147483648" r:id="rId4"/>
   </p:sldMasterIdLst>
   <p:notesMasterIdLst>
-    <p:notesMasterId r:id="rId29"/>
+    <p:notesMasterId r:id="rId30"/>
   </p:notesMasterIdLst>
   <p:handoutMasterIdLst>
-    <p:handoutMasterId r:id="rId30"/>
+    <p:handoutMasterId r:id="rId31"/>
   </p:handoutMasterIdLst>
   <p:sldIdLst>
     <p:sldId id="256" r:id="rId5"/>
@@ -32,9 +32,10 @@
     <p:sldId id="2835" r:id="rId23"/>
     <p:sldId id="2848" r:id="rId24"/>
     <p:sldId id="2850" r:id="rId25"/>
-    <p:sldId id="2854" r:id="rId26"/>
-    <p:sldId id="270" r:id="rId27"/>
-    <p:sldId id="271" r:id="rId28"/>
+    <p:sldId id="2856" r:id="rId26"/>
+    <p:sldId id="2854" r:id="rId27"/>
+    <p:sldId id="270" r:id="rId28"/>
+    <p:sldId id="271" r:id="rId29"/>
   </p:sldIdLst>
   <p:sldSz cx="12192000" cy="6858000"/>
   <p:notesSz cx="6858000" cy="9144000"/>
@@ -485,7 +486,7 @@
           <a:p>
             <a:fld id="{A21F7CDD-23CF-5441-8EE8-3A82C7512332}" type="datetimeFigureOut">
               <a:rPr lang="nl-NL" smtClean="0"/>
-              <a:t>2-5-2023</a:t>
+              <a:t>9-5-2023</a:t>
             </a:fld>
             <a:endParaRPr lang="nl-NL"/>
           </a:p>
@@ -13723,6 +13724,461 @@
           <p:cNvPr id="2" name="Title 1">
             <a:extLst>
               <a:ext uri="{FF2B5EF4-FFF2-40B4-BE49-F238E27FC236}">
+                <a16:creationId xmlns:a16="http://schemas.microsoft.com/office/drawing/2014/main" id="{0F17698B-76A6-7F58-906D-F8B6BA0A6F06}"/>
+              </a:ext>
+            </a:extLst>
+          </p:cNvPr>
+          <p:cNvSpPr>
+            <a:spLocks noGrp="1"/>
+          </p:cNvSpPr>
+          <p:nvPr>
+            <p:ph type="title"/>
+          </p:nvPr>
+        </p:nvSpPr>
+        <p:spPr/>
+        <p:txBody>
+          <a:bodyPr/>
+          <a:lstStyle/>
+          <a:p>
+            <a:r>
+              <a:rPr lang="en-GB" dirty="0"/>
+              <a:t>Weighted mean example</a:t>
+            </a:r>
+          </a:p>
+        </p:txBody>
+      </p:sp>
+      <p:graphicFrame>
+        <p:nvGraphicFramePr>
+          <p:cNvPr id="4" name="Table 4">
+            <a:extLst>
+              <a:ext uri="{FF2B5EF4-FFF2-40B4-BE49-F238E27FC236}">
+                <a16:creationId xmlns:a16="http://schemas.microsoft.com/office/drawing/2014/main" id="{158B38B6-F36A-7CF2-98D1-63F174C0201F}"/>
+              </a:ext>
+            </a:extLst>
+          </p:cNvPr>
+          <p:cNvGraphicFramePr>
+            <a:graphicFrameLocks noGrp="1"/>
+          </p:cNvGraphicFramePr>
+          <p:nvPr>
+            <p:ph idx="1"/>
+            <p:extLst>
+              <p:ext uri="{D42A27DB-BD31-4B8C-83A1-F6EECF244321}">
+                <p14:modId xmlns:p14="http://schemas.microsoft.com/office/powerpoint/2010/main" val="2382954875"/>
+              </p:ext>
+            </p:extLst>
+          </p:nvPr>
+        </p:nvGraphicFramePr>
+        <p:xfrm>
+          <a:off x="5979559" y="1685925"/>
+          <a:ext cx="5637764" cy="2595880"/>
+        </p:xfrm>
+        <a:graphic>
+          <a:graphicData uri="http://schemas.openxmlformats.org/drawingml/2006/table">
+            <a:tbl>
+              <a:tblPr firstRow="1" bandRow="1">
+                <a:tableStyleId>{5C22544A-7EE6-4342-B048-85BDC9FD1C3A}</a:tableStyleId>
+              </a:tblPr>
+              <a:tblGrid>
+                <a:gridCol w="1409441">
+                  <a:extLst>
+                    <a:ext uri="{9D8B030D-6E8A-4147-A177-3AD203B41FA5}">
+                      <a16:colId xmlns:a16="http://schemas.microsoft.com/office/drawing/2014/main" val="2636706770"/>
+                    </a:ext>
+                  </a:extLst>
+                </a:gridCol>
+                <a:gridCol w="1409441">
+                  <a:extLst>
+                    <a:ext uri="{9D8B030D-6E8A-4147-A177-3AD203B41FA5}">
+                      <a16:colId xmlns:a16="http://schemas.microsoft.com/office/drawing/2014/main" val="4265825840"/>
+                    </a:ext>
+                  </a:extLst>
+                </a:gridCol>
+                <a:gridCol w="1409441">
+                  <a:extLst>
+                    <a:ext uri="{9D8B030D-6E8A-4147-A177-3AD203B41FA5}">
+                      <a16:colId xmlns:a16="http://schemas.microsoft.com/office/drawing/2014/main" val="809970461"/>
+                    </a:ext>
+                  </a:extLst>
+                </a:gridCol>
+                <a:gridCol w="1409441">
+                  <a:extLst>
+                    <a:ext uri="{9D8B030D-6E8A-4147-A177-3AD203B41FA5}">
+                      <a16:colId xmlns:a16="http://schemas.microsoft.com/office/drawing/2014/main" val="1786710387"/>
+                    </a:ext>
+                  </a:extLst>
+                </a:gridCol>
+              </a:tblGrid>
+              <a:tr h="370840">
+                <a:tc>
+                  <a:txBody>
+                    <a:bodyPr/>
+                    <a:lstStyle/>
+                    <a:p>
+                      <a:endParaRPr lang="en-GB" dirty="0"/>
+                    </a:p>
+                  </a:txBody>
+                  <a:tcPr/>
+                </a:tc>
+                <a:tc>
+                  <a:txBody>
+                    <a:bodyPr/>
+                    <a:lstStyle/>
+                    <a:p>
+                      <a:endParaRPr lang="en-GB"/>
+                    </a:p>
+                  </a:txBody>
+                  <a:tcPr/>
+                </a:tc>
+                <a:tc>
+                  <a:txBody>
+                    <a:bodyPr/>
+                    <a:lstStyle/>
+                    <a:p>
+                      <a:endParaRPr lang="en-GB"/>
+                    </a:p>
+                  </a:txBody>
+                  <a:tcPr/>
+                </a:tc>
+                <a:tc>
+                  <a:txBody>
+                    <a:bodyPr/>
+                    <a:lstStyle/>
+                    <a:p>
+                      <a:endParaRPr lang="en-GB"/>
+                    </a:p>
+                  </a:txBody>
+                  <a:tcPr/>
+                </a:tc>
+                <a:extLst>
+                  <a:ext uri="{0D108BD9-81ED-4DB2-BD59-A6C34878D82A}">
+                    <a16:rowId xmlns:a16="http://schemas.microsoft.com/office/drawing/2014/main" val="2521188881"/>
+                  </a:ext>
+                </a:extLst>
+              </a:tr>
+              <a:tr h="370840">
+                <a:tc>
+                  <a:txBody>
+                    <a:bodyPr/>
+                    <a:lstStyle/>
+                    <a:p>
+                      <a:endParaRPr lang="en-GB"/>
+                    </a:p>
+                  </a:txBody>
+                  <a:tcPr/>
+                </a:tc>
+                <a:tc>
+                  <a:txBody>
+                    <a:bodyPr/>
+                    <a:lstStyle/>
+                    <a:p>
+                      <a:endParaRPr lang="en-GB"/>
+                    </a:p>
+                  </a:txBody>
+                  <a:tcPr/>
+                </a:tc>
+                <a:tc>
+                  <a:txBody>
+                    <a:bodyPr/>
+                    <a:lstStyle/>
+                    <a:p>
+                      <a:endParaRPr lang="en-GB"/>
+                    </a:p>
+                  </a:txBody>
+                  <a:tcPr/>
+                </a:tc>
+                <a:tc>
+                  <a:txBody>
+                    <a:bodyPr/>
+                    <a:lstStyle/>
+                    <a:p>
+                      <a:endParaRPr lang="en-GB"/>
+                    </a:p>
+                  </a:txBody>
+                  <a:tcPr/>
+                </a:tc>
+                <a:extLst>
+                  <a:ext uri="{0D108BD9-81ED-4DB2-BD59-A6C34878D82A}">
+                    <a16:rowId xmlns:a16="http://schemas.microsoft.com/office/drawing/2014/main" val="2946523968"/>
+                  </a:ext>
+                </a:extLst>
+              </a:tr>
+              <a:tr h="370840">
+                <a:tc>
+                  <a:txBody>
+                    <a:bodyPr/>
+                    <a:lstStyle/>
+                    <a:p>
+                      <a:endParaRPr lang="en-GB"/>
+                    </a:p>
+                  </a:txBody>
+                  <a:tcPr/>
+                </a:tc>
+                <a:tc>
+                  <a:txBody>
+                    <a:bodyPr/>
+                    <a:lstStyle/>
+                    <a:p>
+                      <a:endParaRPr lang="en-GB"/>
+                    </a:p>
+                  </a:txBody>
+                  <a:tcPr/>
+                </a:tc>
+                <a:tc>
+                  <a:txBody>
+                    <a:bodyPr/>
+                    <a:lstStyle/>
+                    <a:p>
+                      <a:endParaRPr lang="en-GB"/>
+                    </a:p>
+                  </a:txBody>
+                  <a:tcPr/>
+                </a:tc>
+                <a:tc>
+                  <a:txBody>
+                    <a:bodyPr/>
+                    <a:lstStyle/>
+                    <a:p>
+                      <a:endParaRPr lang="en-GB"/>
+                    </a:p>
+                  </a:txBody>
+                  <a:tcPr/>
+                </a:tc>
+                <a:extLst>
+                  <a:ext uri="{0D108BD9-81ED-4DB2-BD59-A6C34878D82A}">
+                    <a16:rowId xmlns:a16="http://schemas.microsoft.com/office/drawing/2014/main" val="157343687"/>
+                  </a:ext>
+                </a:extLst>
+              </a:tr>
+              <a:tr h="370840">
+                <a:tc>
+                  <a:txBody>
+                    <a:bodyPr/>
+                    <a:lstStyle/>
+                    <a:p>
+                      <a:endParaRPr lang="en-GB"/>
+                    </a:p>
+                  </a:txBody>
+                  <a:tcPr/>
+                </a:tc>
+                <a:tc>
+                  <a:txBody>
+                    <a:bodyPr/>
+                    <a:lstStyle/>
+                    <a:p>
+                      <a:endParaRPr lang="en-GB"/>
+                    </a:p>
+                  </a:txBody>
+                  <a:tcPr/>
+                </a:tc>
+                <a:tc>
+                  <a:txBody>
+                    <a:bodyPr/>
+                    <a:lstStyle/>
+                    <a:p>
+                      <a:endParaRPr lang="en-GB"/>
+                    </a:p>
+                  </a:txBody>
+                  <a:tcPr/>
+                </a:tc>
+                <a:tc>
+                  <a:txBody>
+                    <a:bodyPr/>
+                    <a:lstStyle/>
+                    <a:p>
+                      <a:endParaRPr lang="en-GB"/>
+                    </a:p>
+                  </a:txBody>
+                  <a:tcPr/>
+                </a:tc>
+                <a:extLst>
+                  <a:ext uri="{0D108BD9-81ED-4DB2-BD59-A6C34878D82A}">
+                    <a16:rowId xmlns:a16="http://schemas.microsoft.com/office/drawing/2014/main" val="768223611"/>
+                  </a:ext>
+                </a:extLst>
+              </a:tr>
+              <a:tr h="370840">
+                <a:tc>
+                  <a:txBody>
+                    <a:bodyPr/>
+                    <a:lstStyle/>
+                    <a:p>
+                      <a:endParaRPr lang="en-GB"/>
+                    </a:p>
+                  </a:txBody>
+                  <a:tcPr/>
+                </a:tc>
+                <a:tc>
+                  <a:txBody>
+                    <a:bodyPr/>
+                    <a:lstStyle/>
+                    <a:p>
+                      <a:endParaRPr lang="en-GB"/>
+                    </a:p>
+                  </a:txBody>
+                  <a:tcPr/>
+                </a:tc>
+                <a:tc>
+                  <a:txBody>
+                    <a:bodyPr/>
+                    <a:lstStyle/>
+                    <a:p>
+                      <a:endParaRPr lang="en-GB"/>
+                    </a:p>
+                  </a:txBody>
+                  <a:tcPr/>
+                </a:tc>
+                <a:tc>
+                  <a:txBody>
+                    <a:bodyPr/>
+                    <a:lstStyle/>
+                    <a:p>
+                      <a:endParaRPr lang="en-GB"/>
+                    </a:p>
+                  </a:txBody>
+                  <a:tcPr/>
+                </a:tc>
+                <a:extLst>
+                  <a:ext uri="{0D108BD9-81ED-4DB2-BD59-A6C34878D82A}">
+                    <a16:rowId xmlns:a16="http://schemas.microsoft.com/office/drawing/2014/main" val="2571505438"/>
+                  </a:ext>
+                </a:extLst>
+              </a:tr>
+              <a:tr h="370840">
+                <a:tc>
+                  <a:txBody>
+                    <a:bodyPr/>
+                    <a:lstStyle/>
+                    <a:p>
+                      <a:endParaRPr lang="en-GB"/>
+                    </a:p>
+                  </a:txBody>
+                  <a:tcPr/>
+                </a:tc>
+                <a:tc>
+                  <a:txBody>
+                    <a:bodyPr/>
+                    <a:lstStyle/>
+                    <a:p>
+                      <a:endParaRPr lang="en-GB"/>
+                    </a:p>
+                  </a:txBody>
+                  <a:tcPr/>
+                </a:tc>
+                <a:tc>
+                  <a:txBody>
+                    <a:bodyPr/>
+                    <a:lstStyle/>
+                    <a:p>
+                      <a:endParaRPr lang="en-GB"/>
+                    </a:p>
+                  </a:txBody>
+                  <a:tcPr/>
+                </a:tc>
+                <a:tc>
+                  <a:txBody>
+                    <a:bodyPr/>
+                    <a:lstStyle/>
+                    <a:p>
+                      <a:endParaRPr lang="en-GB"/>
+                    </a:p>
+                  </a:txBody>
+                  <a:tcPr/>
+                </a:tc>
+                <a:extLst>
+                  <a:ext uri="{0D108BD9-81ED-4DB2-BD59-A6C34878D82A}">
+                    <a16:rowId xmlns:a16="http://schemas.microsoft.com/office/drawing/2014/main" val="3481699447"/>
+                  </a:ext>
+                </a:extLst>
+              </a:tr>
+              <a:tr h="370840">
+                <a:tc>
+                  <a:txBody>
+                    <a:bodyPr/>
+                    <a:lstStyle/>
+                    <a:p>
+                      <a:endParaRPr lang="en-GB"/>
+                    </a:p>
+                  </a:txBody>
+                  <a:tcPr/>
+                </a:tc>
+                <a:tc>
+                  <a:txBody>
+                    <a:bodyPr/>
+                    <a:lstStyle/>
+                    <a:p>
+                      <a:endParaRPr lang="en-GB"/>
+                    </a:p>
+                  </a:txBody>
+                  <a:tcPr/>
+                </a:tc>
+                <a:tc>
+                  <a:txBody>
+                    <a:bodyPr/>
+                    <a:lstStyle/>
+                    <a:p>
+                      <a:endParaRPr lang="en-GB"/>
+                    </a:p>
+                  </a:txBody>
+                  <a:tcPr/>
+                </a:tc>
+                <a:tc>
+                  <a:txBody>
+                    <a:bodyPr/>
+                    <a:lstStyle/>
+                    <a:p>
+                      <a:endParaRPr lang="en-GB" dirty="0"/>
+                    </a:p>
+                  </a:txBody>
+                  <a:tcPr/>
+                </a:tc>
+                <a:extLst>
+                  <a:ext uri="{0D108BD9-81ED-4DB2-BD59-A6C34878D82A}">
+                    <a16:rowId xmlns:a16="http://schemas.microsoft.com/office/drawing/2014/main" val="545376297"/>
+                  </a:ext>
+                </a:extLst>
+              </a:tr>
+            </a:tbl>
+          </a:graphicData>
+        </a:graphic>
+      </p:graphicFrame>
+    </p:spTree>
+    <p:extLst>
+      <p:ext uri="{BB962C8B-B14F-4D97-AF65-F5344CB8AC3E}">
+        <p14:creationId xmlns:p14="http://schemas.microsoft.com/office/powerpoint/2010/main" val="1078063320"/>
+      </p:ext>
+    </p:extLst>
+  </p:cSld>
+  <p:clrMapOvr>
+    <a:masterClrMapping/>
+  </p:clrMapOvr>
+  <p:transition spd="slow">
+    <p:push dir="u"/>
+  </p:transition>
+</p:sld>
+</file>
+
+<file path=ppt/slides/slide23.xml><?xml version="1.0" encoding="utf-8"?>
+<p:sld xmlns:a="http://schemas.openxmlformats.org/drawingml/2006/main" xmlns:r="http://schemas.openxmlformats.org/officeDocument/2006/relationships" xmlns:p="http://schemas.openxmlformats.org/presentationml/2006/main">
+  <p:cSld>
+    <p:spTree>
+      <p:nvGrpSpPr>
+        <p:cNvPr id="1" name=""/>
+        <p:cNvGrpSpPr/>
+        <p:nvPr/>
+      </p:nvGrpSpPr>
+      <p:grpSpPr>
+        <a:xfrm>
+          <a:off x="0" y="0"/>
+          <a:ext cx="0" cy="0"/>
+          <a:chOff x="0" y="0"/>
+          <a:chExt cx="0" cy="0"/>
+        </a:xfrm>
+      </p:grpSpPr>
+      <p:sp>
+        <p:nvSpPr>
+          <p:cNvPr id="2" name="Title 1">
+            <a:extLst>
+              <a:ext uri="{FF2B5EF4-FFF2-40B4-BE49-F238E27FC236}">
                 <a16:creationId xmlns:a16="http://schemas.microsoft.com/office/drawing/2014/main" id="{DC45B73F-B43E-2FB4-32C2-9C5E1D4405B0}"/>
               </a:ext>
             </a:extLst>
@@ -13989,6 +14445,41 @@
               <a:t> is.</a:t>
             </a:r>
           </a:p>
+          <a:p>
+            <a:r>
+              <a:rPr lang="en-GB" dirty="0" err="1"/>
+              <a:t>Denk</a:t>
+            </a:r>
+            <a:r>
+              <a:rPr lang="en-GB" dirty="0"/>
+              <a:t> </a:t>
+            </a:r>
+            <a:r>
+              <a:rPr lang="en-GB" dirty="0" err="1"/>
+              <a:t>ook</a:t>
+            </a:r>
+            <a:r>
+              <a:rPr lang="en-GB" dirty="0"/>
+              <a:t> </a:t>
+            </a:r>
+            <a:r>
+              <a:rPr lang="en-GB" dirty="0" err="1"/>
+              <a:t>aan</a:t>
+            </a:r>
+            <a:r>
+              <a:rPr lang="en-GB" dirty="0"/>
+              <a:t> </a:t>
+            </a:r>
+            <a:r>
+              <a:rPr lang="en-GB" dirty="0" err="1"/>
+              <a:t>ondergerepresenteerde</a:t>
+            </a:r>
+            <a:r>
+              <a:rPr lang="en-GB"/>
+              <a:t>/ </a:t>
+            </a:r>
+            <a:endParaRPr lang="en-GB" dirty="0"/>
+          </a:p>
         </p:txBody>
       </p:sp>
     </p:spTree>
@@ -14007,7 +14498,7 @@
 </p:sld>
 </file>
 
-<file path=ppt/slides/slide23.xml><?xml version="1.0" encoding="utf-8"?>
+<file path=ppt/slides/slide24.xml><?xml version="1.0" encoding="utf-8"?>
 <p:sld xmlns:a="http://schemas.openxmlformats.org/drawingml/2006/main" xmlns:r="http://schemas.openxmlformats.org/officeDocument/2006/relationships" xmlns:p="http://schemas.openxmlformats.org/presentationml/2006/main">
   <p:cSld>
     <p:spTree>
@@ -14125,7 +14616,7 @@
 </p:sld>
 </file>
 
-<file path=ppt/slides/slide24.xml><?xml version="1.0" encoding="utf-8"?>
+<file path=ppt/slides/slide25.xml><?xml version="1.0" encoding="utf-8"?>
 <p:sld xmlns:a="http://schemas.openxmlformats.org/drawingml/2006/main" xmlns:r="http://schemas.openxmlformats.org/officeDocument/2006/relationships" xmlns:p="http://schemas.openxmlformats.org/presentationml/2006/main">
   <p:cSld>
     <p:spTree>
@@ -18703,12 +19194,9 @@
 </file>
 
 <file path=customXml/item1.xml><?xml version="1.0" encoding="utf-8"?>
-<?mso-contentType ?>
-<FormTemplates xmlns="http://schemas.microsoft.com/sharepoint/v3/contenttype/forms">
-  <Display>DocumentLibraryForm</Display>
-  <Edit>DocumentLibraryForm</Edit>
-  <New>DocumentLibraryForm</New>
-</FormTemplates>
+<p:properties xmlns:p="http://schemas.microsoft.com/office/2006/metadata/properties" xmlns:xsi="http://www.w3.org/2001/XMLSchema-instance" xmlns:pc="http://schemas.microsoft.com/office/infopath/2007/PartnerControls">
+  <documentManagement/>
+</p:properties>
 </file>
 
 <file path=customXml/item2.xml><?xml version="1.0" encoding="utf-8"?>
@@ -18923,15 +19411,27 @@
 </file>
 
 <file path=customXml/item3.xml><?xml version="1.0" encoding="utf-8"?>
-<p:properties xmlns:p="http://schemas.microsoft.com/office/2006/metadata/properties" xmlns:xsi="http://www.w3.org/2001/XMLSchema-instance" xmlns:pc="http://schemas.microsoft.com/office/infopath/2007/PartnerControls">
-  <documentManagement/>
-</p:properties>
+<?mso-contentType ?>
+<FormTemplates xmlns="http://schemas.microsoft.com/sharepoint/v3/contenttype/forms">
+  <Display>DocumentLibraryForm</Display>
+  <Edit>DocumentLibraryForm</Edit>
+  <New>DocumentLibraryForm</New>
+</FormTemplates>
 </file>
 
 <file path=customXml/itemProps1.xml><?xml version="1.0" encoding="utf-8"?>
-<ds:datastoreItem xmlns:ds="http://schemas.openxmlformats.org/officeDocument/2006/customXml" ds:itemID="{2EBDE53D-6E78-4709-828D-56940832F243}">
+<ds:datastoreItem xmlns:ds="http://schemas.openxmlformats.org/officeDocument/2006/customXml" ds:itemID="{7E178D45-7F39-4ADD-A744-70639435E68C}">
   <ds:schemaRefs>
-    <ds:schemaRef ds:uri="http://schemas.microsoft.com/sharepoint/v3/contenttype/forms"/>
+    <ds:schemaRef ds:uri="http://purl.org/dc/elements/1.1/"/>
+    <ds:schemaRef ds:uri="d5f8be41-0169-49b5-b686-d4287d5aac73"/>
+    <ds:schemaRef ds:uri="http://schemas.microsoft.com/office/infopath/2007/PartnerControls"/>
+    <ds:schemaRef ds:uri="http://purl.org/dc/terms/"/>
+    <ds:schemaRef ds:uri="http://schemas.microsoft.com/office/2006/documentManagement/types"/>
+    <ds:schemaRef ds:uri="e60f335d-e4bd-4666-890a-892f5e8cff2d"/>
+    <ds:schemaRef ds:uri="http://schemas.openxmlformats.org/package/2006/metadata/core-properties"/>
+    <ds:schemaRef ds:uri="http://schemas.microsoft.com/office/2006/metadata/properties"/>
+    <ds:schemaRef ds:uri="http://www.w3.org/XML/1998/namespace"/>
+    <ds:schemaRef ds:uri="http://purl.org/dc/dcmitype/"/>
   </ds:schemaRefs>
 </ds:datastoreItem>
 </file>
@@ -18956,18 +19456,9 @@
 </file>
 
 <file path=customXml/itemProps3.xml><?xml version="1.0" encoding="utf-8"?>
-<ds:datastoreItem xmlns:ds="http://schemas.openxmlformats.org/officeDocument/2006/customXml" ds:itemID="{7E178D45-7F39-4ADD-A744-70639435E68C}">
+<ds:datastoreItem xmlns:ds="http://schemas.openxmlformats.org/officeDocument/2006/customXml" ds:itemID="{2EBDE53D-6E78-4709-828D-56940832F243}">
   <ds:schemaRefs>
-    <ds:schemaRef ds:uri="http://purl.org/dc/elements/1.1/"/>
-    <ds:schemaRef ds:uri="d5f8be41-0169-49b5-b686-d4287d5aac73"/>
-    <ds:schemaRef ds:uri="http://schemas.microsoft.com/office/infopath/2007/PartnerControls"/>
-    <ds:schemaRef ds:uri="http://purl.org/dc/terms/"/>
-    <ds:schemaRef ds:uri="http://schemas.microsoft.com/office/2006/documentManagement/types"/>
-    <ds:schemaRef ds:uri="e60f335d-e4bd-4666-890a-892f5e8cff2d"/>
-    <ds:schemaRef ds:uri="http://schemas.openxmlformats.org/package/2006/metadata/core-properties"/>
-    <ds:schemaRef ds:uri="http://schemas.microsoft.com/office/2006/metadata/properties"/>
-    <ds:schemaRef ds:uri="http://www.w3.org/XML/1998/namespace"/>
-    <ds:schemaRef ds:uri="http://purl.org/dc/dcmitype/"/>
+    <ds:schemaRef ds:uri="http://schemas.microsoft.com/sharepoint/v3/contenttype/forms"/>
   </ds:schemaRefs>
 </ds:datastoreItem>
 </file>
</xml_diff>